<commit_message>
Fun fun fun with C++
</commit_message>
<xml_diff>
--- a/6019_Phys_1/D2D/W01/INFO_6019_Physics_1_F24_W01D01_Course_Intro.pptx
+++ b/6019_Phys_1/D2D/W01/INFO_6019_Physics_1_F24_W01D01_Course_Intro.pptx
@@ -8849,70 +8849,28 @@
               <a:defRPr/>
             </a:pPr>
             <a:r>
+              <a:rPr lang="en-US" sz="2800" dirty="0">
+                <a:hlinkClick r:id="rId2"/>
+              </a:rPr>
+              <a:t>mfeeney@fanshawe</a:t>
+            </a:r>
+            <a:r>
+              <a:rPr lang="en-US" sz="2800" b="1" i="1" dirty="0">
+                <a:hlinkClick r:id="rId2"/>
+              </a:rPr>
+              <a:t>online</a:t>
+            </a:r>
+            <a:r>
+              <a:rPr lang="en-US" sz="2800" dirty="0">
+                <a:hlinkClick r:id="rId2"/>
+              </a:rPr>
+              <a:t>.ca</a:t>
+            </a:r>
+            <a:r>
               <a:rPr lang="en-US" sz="2800" dirty="0"/>
-              <a:t>Please, please, please, please, please, please, please, please ,please, please, please, please, </a:t>
-            </a:r>
-            <a:r>
-              <a:rPr lang="en-US" b="1" i="1" u="sng" dirty="0"/>
-              <a:t>DON’T</a:t>
-            </a:r>
-            <a:r>
-              <a:rPr lang="en-US" sz="2800" dirty="0"/>
-              <a:t> e-mail me at mfeeney@fanshawe</a:t>
-            </a:r>
-            <a:r>
-              <a:rPr lang="en-US" sz="2800" b="1" i="1" dirty="0"/>
-              <a:t>online</a:t>
-            </a:r>
-            <a:r>
-              <a:rPr lang="en-US" sz="2800" dirty="0"/>
-              <a:t>.ca</a:t>
+              <a:t> gets forwarded to the one above anyway…</a:t>
             </a:r>
             <a:endParaRPr lang="en-CA" sz="2800" dirty="0"/>
-          </a:p>
-        </p:txBody>
-      </p:sp>
-      <p:sp>
-        <p:nvSpPr>
-          <p:cNvPr id="115717" name="AutoShape 5"/>
-          <p:cNvSpPr>
-            <a:spLocks noChangeArrowheads="1"/>
-          </p:cNvSpPr>
-          <p:nvPr/>
-        </p:nvSpPr>
-        <p:spPr bwMode="auto">
-          <a:xfrm rot="-2603730">
-            <a:off x="4515574" y="3052220"/>
-            <a:ext cx="3429000" cy="1200150"/>
-          </a:xfrm>
-          <a:prstGeom prst="leftArrow">
-            <a:avLst>
-              <a:gd name="adj1" fmla="val 43667"/>
-              <a:gd name="adj2" fmla="val 111498"/>
-            </a:avLst>
-          </a:prstGeom>
-          <a:solidFill>
-            <a:srgbClr val="00B8FF"/>
-          </a:solidFill>
-          <a:ln w="9525">
-            <a:solidFill>
-              <a:schemeClr val="tx1"/>
-            </a:solidFill>
-            <a:miter lim="800000"/>
-            <a:headEnd/>
-            <a:tailEnd/>
-          </a:ln>
-        </p:spPr>
-        <p:txBody>
-          <a:bodyPr wrap="none" anchor="ctr"/>
-          <a:lstStyle/>
-          <a:p>
-            <a:pPr algn="ctr"/>
-            <a:r>
-              <a:rPr lang="en-US" b="1"/>
-              <a:t>Use this one</a:t>
-            </a:r>
-            <a:endParaRPr lang="en-CA" b="1"/>
           </a:p>
         </p:txBody>
       </p:sp>
@@ -8962,7 +8920,7 @@
           <p:nvPr/>
         </p:nvPicPr>
         <p:blipFill>
-          <a:blip r:embed="rId2" cstate="print"/>
+          <a:blip r:embed="rId3" cstate="print"/>
           <a:srcRect/>
           <a:stretch>
             <a:fillRect/>
@@ -9283,112 +9241,21 @@
                             </p:childTnLst>
                           </p:cTn>
                         </p:par>
-                      </p:childTnLst>
-                    </p:cTn>
-                  </p:par>
-                  <p:par>
-                    <p:cTn id="23" fill="hold">
-                      <p:stCondLst>
-                        <p:cond delay="indefinite"/>
-                      </p:stCondLst>
-                      <p:childTnLst>
                         <p:par>
-                          <p:cTn id="24" fill="hold">
+                          <p:cTn id="23" fill="hold">
                             <p:stCondLst>
-                              <p:cond delay="0"/>
+                              <p:cond delay="500"/>
                             </p:stCondLst>
                             <p:childTnLst>
                               <p:par>
-                                <p:cTn id="25" presetID="2" presetClass="entr" presetSubtype="3" fill="hold" grpId="0" nodeType="clickEffect">
+                                <p:cTn id="24" presetID="5" presetClass="entr" presetSubtype="10" fill="hold" nodeType="afterEffect">
                                   <p:stCondLst>
                                     <p:cond delay="0"/>
                                   </p:stCondLst>
                                   <p:childTnLst>
                                     <p:set>
                                       <p:cBhvr>
-                                        <p:cTn id="26" dur="1" fill="hold">
-                                          <p:stCondLst>
-                                            <p:cond delay="0"/>
-                                          </p:stCondLst>
-                                        </p:cTn>
-                                        <p:tgtEl>
-                                          <p:spTgt spid="115717"/>
-                                        </p:tgtEl>
-                                        <p:attrNameLst>
-                                          <p:attrName>style.visibility</p:attrName>
-                                        </p:attrNameLst>
-                                      </p:cBhvr>
-                                      <p:to>
-                                        <p:strVal val="visible"/>
-                                      </p:to>
-                                    </p:set>
-                                    <p:anim calcmode="lin" valueType="num">
-                                      <p:cBhvr additive="base">
-                                        <p:cTn id="27" dur="1000" fill="hold"/>
-                                        <p:tgtEl>
-                                          <p:spTgt spid="115717"/>
-                                        </p:tgtEl>
-                                        <p:attrNameLst>
-                                          <p:attrName>ppt_x</p:attrName>
-                                        </p:attrNameLst>
-                                      </p:cBhvr>
-                                      <p:tavLst>
-                                        <p:tav tm="0">
-                                          <p:val>
-                                            <p:strVal val="1+#ppt_w/2"/>
-                                          </p:val>
-                                        </p:tav>
-                                        <p:tav tm="100000">
-                                          <p:val>
-                                            <p:strVal val="#ppt_x"/>
-                                          </p:val>
-                                        </p:tav>
-                                      </p:tavLst>
-                                    </p:anim>
-                                    <p:anim calcmode="lin" valueType="num">
-                                      <p:cBhvr additive="base">
-                                        <p:cTn id="28" dur="1000" fill="hold"/>
-                                        <p:tgtEl>
-                                          <p:spTgt spid="115717"/>
-                                        </p:tgtEl>
-                                        <p:attrNameLst>
-                                          <p:attrName>ppt_y</p:attrName>
-                                        </p:attrNameLst>
-                                      </p:cBhvr>
-                                      <p:tavLst>
-                                        <p:tav tm="0">
-                                          <p:val>
-                                            <p:strVal val="0-#ppt_h/2"/>
-                                          </p:val>
-                                        </p:tav>
-                                        <p:tav tm="100000">
-                                          <p:val>
-                                            <p:strVal val="#ppt_y"/>
-                                          </p:val>
-                                        </p:tav>
-                                      </p:tavLst>
-                                    </p:anim>
-                                  </p:childTnLst>
-                                </p:cTn>
-                              </p:par>
-                            </p:childTnLst>
-                          </p:cTn>
-                        </p:par>
-                        <p:par>
-                          <p:cTn id="29" fill="hold">
-                            <p:stCondLst>
-                              <p:cond delay="1000"/>
-                            </p:stCondLst>
-                            <p:childTnLst>
-                              <p:par>
-                                <p:cTn id="30" presetID="5" presetClass="entr" presetSubtype="10" fill="hold" nodeType="afterEffect">
-                                  <p:stCondLst>
-                                    <p:cond delay="0"/>
-                                  </p:stCondLst>
-                                  <p:childTnLst>
-                                    <p:set>
-                                      <p:cBhvr>
-                                        <p:cTn id="31" dur="1" fill="hold">
+                                        <p:cTn id="25" dur="1" fill="hold">
                                           <p:stCondLst>
                                             <p:cond delay="0"/>
                                           </p:stCondLst>
@@ -9406,7 +9273,7 @@
                                     </p:set>
                                     <p:animEffect transition="in" filter="checkerboard(across)">
                                       <p:cBhvr>
-                                        <p:cTn id="32" dur="500"/>
+                                        <p:cTn id="26" dur="500"/>
                                         <p:tgtEl>
                                           <p:spTgt spid="115719"/>
                                         </p:tgtEl>
@@ -9419,20 +9286,20 @@
                           </p:cTn>
                         </p:par>
                         <p:par>
-                          <p:cTn id="33" fill="hold">
+                          <p:cTn id="27" fill="hold">
                             <p:stCondLst>
-                              <p:cond delay="1500"/>
+                              <p:cond delay="1000"/>
                             </p:stCondLst>
                             <p:childTnLst>
                               <p:par>
-                                <p:cTn id="34" presetID="5" presetClass="entr" presetSubtype="10" fill="hold" grpId="0" nodeType="afterEffect">
+                                <p:cTn id="28" presetID="5" presetClass="entr" presetSubtype="10" fill="hold" grpId="0" nodeType="afterEffect">
                                   <p:stCondLst>
                                     <p:cond delay="0"/>
                                   </p:stCondLst>
                                   <p:childTnLst>
                                     <p:set>
                                       <p:cBhvr>
-                                        <p:cTn id="35" dur="1" fill="hold">
+                                        <p:cTn id="29" dur="1" fill="hold">
                                           <p:stCondLst>
                                             <p:cond delay="0"/>
                                           </p:stCondLst>
@@ -9450,7 +9317,7 @@
                                     </p:set>
                                     <p:animEffect transition="in" filter="checkerboard(across)">
                                       <p:cBhvr>
-                                        <p:cTn id="36" dur="500"/>
+                                        <p:cTn id="30" dur="500"/>
                                         <p:tgtEl>
                                           <p:spTgt spid="10"/>
                                         </p:tgtEl>
@@ -9466,26 +9333,26 @@
                     </p:cTn>
                   </p:par>
                   <p:par>
-                    <p:cTn id="37" fill="hold">
+                    <p:cTn id="31" fill="hold">
                       <p:stCondLst>
                         <p:cond delay="indefinite"/>
                       </p:stCondLst>
                       <p:childTnLst>
                         <p:par>
-                          <p:cTn id="38" fill="hold">
+                          <p:cTn id="32" fill="hold">
                             <p:stCondLst>
                               <p:cond delay="0"/>
                             </p:stCondLst>
                             <p:childTnLst>
                               <p:par>
-                                <p:cTn id="39" presetID="10" presetClass="entr" presetSubtype="0" fill="hold" grpId="0" nodeType="clickEffect">
+                                <p:cTn id="33" presetID="10" presetClass="entr" presetSubtype="0" fill="hold" grpId="0" nodeType="clickEffect">
                                   <p:stCondLst>
                                     <p:cond delay="0"/>
                                   </p:stCondLst>
                                   <p:childTnLst>
                                     <p:set>
                                       <p:cBhvr>
-                                        <p:cTn id="40" dur="1" fill="hold">
+                                        <p:cTn id="34" dur="1" fill="hold">
                                           <p:stCondLst>
                                             <p:cond delay="0"/>
                                           </p:stCondLst>
@@ -9503,7 +9370,7 @@
                                     </p:set>
                                     <p:animEffect transition="in" filter="fade">
                                       <p:cBhvr>
-                                        <p:cTn id="41" dur="500"/>
+                                        <p:cTn id="35" dur="500"/>
                                         <p:tgtEl>
                                           <p:spTgt spid="115718"/>
                                         </p:tgtEl>
@@ -9541,7 +9408,6 @@
     </p:tnLst>
     <p:bldLst>
       <p:bldP spid="115715" grpId="0" build="p"/>
-      <p:bldP spid="115717" grpId="0" animBg="1"/>
       <p:bldP spid="115718" grpId="0" animBg="1"/>
       <p:bldP spid="10" grpId="0" animBg="1"/>
     </p:bldLst>

</xml_diff>